<commit_message>
Reading assignment 02 finished
</commit_message>
<xml_diff>
--- a/Reading Assignments/02/Reading-02-Boyang Xiao.pptx
+++ b/Reading Assignments/02/Reading-02-Boyang Xiao.pptx
@@ -14,6 +14,9 @@
     <p:sldId id="262" r:id="rId8"/>
     <p:sldId id="263" r:id="rId9"/>
     <p:sldId id="264" r:id="rId10"/>
+    <p:sldId id="265" r:id="rId11"/>
+    <p:sldId id="266" r:id="rId12"/>
+    <p:sldId id="267" r:id="rId13"/>
   </p:sldIdLst>
   <p:sldSz cx="12192000" cy="6858000"/>
   <p:notesSz cx="6858000" cy="9144000"/>
@@ -3449,6 +3452,500 @@
 </p:sld>
 </file>
 
+<file path=ppt/slides/slide10.xml><?xml version="1.0" encoding="utf-8"?>
+<p:sld xmlns:a="http://schemas.openxmlformats.org/drawingml/2006/main" xmlns:r="http://schemas.openxmlformats.org/officeDocument/2006/relationships" xmlns:p="http://schemas.openxmlformats.org/presentationml/2006/main">
+  <p:cSld>
+    <p:spTree>
+      <p:nvGrpSpPr>
+        <p:cNvPr id="1" name=""/>
+        <p:cNvGrpSpPr/>
+        <p:nvPr/>
+      </p:nvGrpSpPr>
+      <p:grpSpPr>
+        <a:xfrm>
+          <a:off x="0" y="0"/>
+          <a:ext cx="0" cy="0"/>
+          <a:chOff x="0" y="0"/>
+          <a:chExt cx="0" cy="0"/>
+        </a:xfrm>
+      </p:grpSpPr>
+      <p:sp>
+        <p:nvSpPr>
+          <p:cNvPr id="2" name="Title 1">
+            <a:extLst>
+              <a:ext uri="{FF2B5EF4-FFF2-40B4-BE49-F238E27FC236}">
+                <a16:creationId xmlns:a16="http://schemas.microsoft.com/office/drawing/2014/main" id="{F604D7E0-0FD4-97CA-E7CA-A84DEEC29770}"/>
+              </a:ext>
+            </a:extLst>
+          </p:cNvPr>
+          <p:cNvSpPr>
+            <a:spLocks noGrp="1"/>
+          </p:cNvSpPr>
+          <p:nvPr>
+            <p:ph type="title"/>
+          </p:nvPr>
+        </p:nvSpPr>
+        <p:spPr/>
+        <p:txBody>
+          <a:bodyPr>
+            <a:normAutofit/>
+          </a:bodyPr>
+          <a:lstStyle/>
+          <a:p>
+            <a:r>
+              <a:rPr lang="en-US" altLang="zh-CN" sz="3600" dirty="0"/>
+              <a:t>Multiple TCP connections</a:t>
+            </a:r>
+            <a:endParaRPr lang="en-US" sz="3600" dirty="0"/>
+          </a:p>
+        </p:txBody>
+      </p:sp>
+      <p:sp>
+        <p:nvSpPr>
+          <p:cNvPr id="3" name="Content Placeholder 2">
+            <a:extLst>
+              <a:ext uri="{FF2B5EF4-FFF2-40B4-BE49-F238E27FC236}">
+                <a16:creationId xmlns:a16="http://schemas.microsoft.com/office/drawing/2014/main" id="{B92CAAB0-C72A-7473-FE2C-725DD06059FF}"/>
+              </a:ext>
+            </a:extLst>
+          </p:cNvPr>
+          <p:cNvSpPr>
+            <a:spLocks noGrp="1"/>
+          </p:cNvSpPr>
+          <p:nvPr>
+            <p:ph idx="1"/>
+          </p:nvPr>
+        </p:nvSpPr>
+        <p:spPr/>
+        <p:txBody>
+          <a:bodyPr/>
+          <a:lstStyle/>
+          <a:p>
+            <a:r>
+              <a:rPr lang="en-US" sz="2400" dirty="0"/>
+              <a:t>Scenario:</a:t>
+            </a:r>
+          </a:p>
+          <a:p>
+            <a:pPr lvl="1"/>
+            <a:r>
+              <a:rPr lang="en-US" sz="2000" dirty="0"/>
+              <a:t>Longer RTT</a:t>
+            </a:r>
+          </a:p>
+          <a:p>
+            <a:pPr lvl="1"/>
+            <a:r>
+              <a:rPr lang="en-US" sz="2000" dirty="0"/>
+              <a:t>Multiple TCP connections</a:t>
+            </a:r>
+          </a:p>
+          <a:p>
+            <a:pPr lvl="1"/>
+            <a:r>
+              <a:rPr lang="en-US" sz="2000" dirty="0"/>
+              <a:t>Window adjustment mechanisms</a:t>
+            </a:r>
+          </a:p>
+          <a:p>
+            <a:r>
+              <a:rPr lang="en-US" sz="2400" dirty="0"/>
+              <a:t>Numerical analysis and results:</a:t>
+            </a:r>
+          </a:p>
+          <a:p>
+            <a:pPr marL="457200" lvl="1" indent="0">
+              <a:buNone/>
+            </a:pPr>
+            <a:r>
+              <a:rPr lang="en-US" sz="2000" dirty="0"/>
+              <a:t>- Case 1: Small buffers			- Case 2: Larger buffers</a:t>
+            </a:r>
+          </a:p>
+          <a:p>
+            <a:pPr lvl="1"/>
+            <a:endParaRPr lang="en-US" dirty="0"/>
+          </a:p>
+        </p:txBody>
+      </p:sp>
+      <p:pic>
+        <p:nvPicPr>
+          <p:cNvPr id="5" name="Picture 4">
+            <a:extLst>
+              <a:ext uri="{FF2B5EF4-FFF2-40B4-BE49-F238E27FC236}">
+                <a16:creationId xmlns:a16="http://schemas.microsoft.com/office/drawing/2014/main" id="{BF036AC9-AF96-3E3E-9927-1F37FBCFED13}"/>
+              </a:ext>
+            </a:extLst>
+          </p:cNvPr>
+          <p:cNvPicPr>
+            <a:picLocks noChangeAspect="1"/>
+          </p:cNvPicPr>
+          <p:nvPr/>
+        </p:nvPicPr>
+        <p:blipFill>
+          <a:blip r:embed="rId2">
+            <a:extLst>
+              <a:ext uri="{28A0092B-C50C-407E-A947-70E740481C1C}">
+                <a14:useLocalDpi xmlns:a14="http://schemas.microsoft.com/office/drawing/2010/main" val="0"/>
+              </a:ext>
+            </a:extLst>
+          </a:blip>
+          <a:stretch>
+            <a:fillRect/>
+          </a:stretch>
+        </p:blipFill>
+        <p:spPr>
+          <a:xfrm>
+            <a:off x="838200" y="4182045"/>
+            <a:ext cx="4696160" cy="1708392"/>
+          </a:xfrm>
+          <a:prstGeom prst="rect">
+            <a:avLst/>
+          </a:prstGeom>
+        </p:spPr>
+      </p:pic>
+      <p:pic>
+        <p:nvPicPr>
+          <p:cNvPr id="7" name="Picture 6">
+            <a:extLst>
+              <a:ext uri="{FF2B5EF4-FFF2-40B4-BE49-F238E27FC236}">
+                <a16:creationId xmlns:a16="http://schemas.microsoft.com/office/drawing/2014/main" id="{9D2205BF-A7BB-7A44-95C0-DBDD88A93D16}"/>
+              </a:ext>
+            </a:extLst>
+          </p:cNvPr>
+          <p:cNvPicPr>
+            <a:picLocks noChangeAspect="1"/>
+          </p:cNvPicPr>
+          <p:nvPr/>
+        </p:nvPicPr>
+        <p:blipFill>
+          <a:blip r:embed="rId3">
+            <a:extLst>
+              <a:ext uri="{28A0092B-C50C-407E-A947-70E740481C1C}">
+                <a14:useLocalDpi xmlns:a14="http://schemas.microsoft.com/office/drawing/2010/main" val="0"/>
+              </a:ext>
+            </a:extLst>
+          </a:blip>
+          <a:stretch>
+            <a:fillRect/>
+          </a:stretch>
+        </p:blipFill>
+        <p:spPr>
+          <a:xfrm>
+            <a:off x="6096001" y="4075719"/>
+            <a:ext cx="4696160" cy="785311"/>
+          </a:xfrm>
+          <a:prstGeom prst="rect">
+            <a:avLst/>
+          </a:prstGeom>
+        </p:spPr>
+      </p:pic>
+      <p:pic>
+        <p:nvPicPr>
+          <p:cNvPr id="9" name="Picture 8">
+            <a:extLst>
+              <a:ext uri="{FF2B5EF4-FFF2-40B4-BE49-F238E27FC236}">
+                <a16:creationId xmlns:a16="http://schemas.microsoft.com/office/drawing/2014/main" id="{ACEAF276-3C69-E82F-F32C-B626E694AF6C}"/>
+              </a:ext>
+            </a:extLst>
+          </p:cNvPr>
+          <p:cNvPicPr>
+            <a:picLocks noChangeAspect="1"/>
+          </p:cNvPicPr>
+          <p:nvPr/>
+        </p:nvPicPr>
+        <p:blipFill>
+          <a:blip r:embed="rId4">
+            <a:extLst>
+              <a:ext uri="{28A0092B-C50C-407E-A947-70E740481C1C}">
+                <a14:useLocalDpi xmlns:a14="http://schemas.microsoft.com/office/drawing/2010/main" val="0"/>
+              </a:ext>
+            </a:extLst>
+          </a:blip>
+          <a:stretch>
+            <a:fillRect/>
+          </a:stretch>
+        </p:blipFill>
+        <p:spPr>
+          <a:xfrm>
+            <a:off x="6154593" y="5036241"/>
+            <a:ext cx="4351079" cy="786428"/>
+          </a:xfrm>
+          <a:prstGeom prst="rect">
+            <a:avLst/>
+          </a:prstGeom>
+        </p:spPr>
+      </p:pic>
+    </p:spTree>
+    <p:extLst>
+      <p:ext uri="{BB962C8B-B14F-4D97-AF65-F5344CB8AC3E}">
+        <p14:creationId xmlns:p14="http://schemas.microsoft.com/office/powerpoint/2010/main" val="2760887343"/>
+      </p:ext>
+    </p:extLst>
+  </p:cSld>
+  <p:clrMapOvr>
+    <a:masterClrMapping/>
+  </p:clrMapOvr>
+</p:sld>
+</file>
+
+<file path=ppt/slides/slide11.xml><?xml version="1.0" encoding="utf-8"?>
+<p:sld xmlns:a="http://schemas.openxmlformats.org/drawingml/2006/main" xmlns:r="http://schemas.openxmlformats.org/officeDocument/2006/relationships" xmlns:p="http://schemas.openxmlformats.org/presentationml/2006/main">
+  <p:cSld>
+    <p:spTree>
+      <p:nvGrpSpPr>
+        <p:cNvPr id="1" name=""/>
+        <p:cNvGrpSpPr/>
+        <p:nvPr/>
+      </p:nvGrpSpPr>
+      <p:grpSpPr>
+        <a:xfrm>
+          <a:off x="0" y="0"/>
+          <a:ext cx="0" cy="0"/>
+          <a:chOff x="0" y="0"/>
+          <a:chExt cx="0" cy="0"/>
+        </a:xfrm>
+      </p:grpSpPr>
+      <p:sp>
+        <p:nvSpPr>
+          <p:cNvPr id="2" name="Title 1">
+            <a:extLst>
+              <a:ext uri="{FF2B5EF4-FFF2-40B4-BE49-F238E27FC236}">
+                <a16:creationId xmlns:a16="http://schemas.microsoft.com/office/drawing/2014/main" id="{DD6DA98C-BE30-1777-EBC5-8690B960D401}"/>
+              </a:ext>
+            </a:extLst>
+          </p:cNvPr>
+          <p:cNvSpPr>
+            <a:spLocks noGrp="1"/>
+          </p:cNvSpPr>
+          <p:nvPr>
+            <p:ph type="title"/>
+          </p:nvPr>
+        </p:nvSpPr>
+        <p:spPr>
+          <a:xfrm>
+            <a:off x="838200" y="280064"/>
+            <a:ext cx="10515600" cy="1325563"/>
+          </a:xfrm>
+        </p:spPr>
+        <p:txBody>
+          <a:bodyPr>
+            <a:normAutofit/>
+          </a:bodyPr>
+          <a:lstStyle/>
+          <a:p>
+            <a:r>
+              <a:rPr lang="en-US" altLang="zh-CN" sz="4000" dirty="0"/>
+              <a:t>Conclusions and further works</a:t>
+            </a:r>
+            <a:endParaRPr lang="en-US" sz="4000" dirty="0"/>
+          </a:p>
+        </p:txBody>
+      </p:sp>
+      <p:sp>
+        <p:nvSpPr>
+          <p:cNvPr id="3" name="Content Placeholder 2">
+            <a:extLst>
+              <a:ext uri="{FF2B5EF4-FFF2-40B4-BE49-F238E27FC236}">
+                <a16:creationId xmlns:a16="http://schemas.microsoft.com/office/drawing/2014/main" id="{5E5DE27D-D1F9-FE1E-C80F-75C69EFAAE37}"/>
+              </a:ext>
+            </a:extLst>
+          </p:cNvPr>
+          <p:cNvSpPr>
+            <a:spLocks noGrp="1"/>
+          </p:cNvSpPr>
+          <p:nvPr>
+            <p:ph idx="1"/>
+          </p:nvPr>
+        </p:nvSpPr>
+        <p:spPr>
+          <a:xfrm>
+            <a:off x="838200" y="1467293"/>
+            <a:ext cx="10515600" cy="4709670"/>
+          </a:xfrm>
+        </p:spPr>
+        <p:txBody>
+          <a:bodyPr>
+            <a:normAutofit lnSpcReduction="10000"/>
+          </a:bodyPr>
+          <a:lstStyle/>
+          <a:p>
+            <a:r>
+              <a:rPr lang="en-US" dirty="0"/>
+              <a:t>TCP's TAHOE feature makes exponential increase of window size in slow start necessary</a:t>
+            </a:r>
+          </a:p>
+          <a:p>
+            <a:r>
+              <a:rPr lang="en-US" dirty="0"/>
+              <a:t>TCP’s vulnerability makes it difficult to multiplex data traffic with real-time delivering rate</a:t>
+            </a:r>
+          </a:p>
+          <a:p>
+            <a:r>
+              <a:rPr lang="en-US" dirty="0"/>
+              <a:t>TCP’s unfairness towards connections with higher delays could cause performance problems when multiplexing short and long-haul traffic on WANs</a:t>
+            </a:r>
+          </a:p>
+          <a:p>
+            <a:r>
+              <a:rPr lang="en-US" dirty="0"/>
+              <a:t>Loss is the only ways for feedback in TCP and it leads to excessive delays</a:t>
+            </a:r>
+          </a:p>
+          <a:p>
+            <a:r>
+              <a:rPr lang="en-US" dirty="0"/>
+              <a:t>Bias against connections with higher delays can be removed by modifying mechanisms for probing for bandwidth during congestions</a:t>
+            </a:r>
+          </a:p>
+        </p:txBody>
+      </p:sp>
+    </p:spTree>
+    <p:extLst>
+      <p:ext uri="{BB962C8B-B14F-4D97-AF65-F5344CB8AC3E}">
+        <p14:creationId xmlns:p14="http://schemas.microsoft.com/office/powerpoint/2010/main" val="541668804"/>
+      </p:ext>
+    </p:extLst>
+  </p:cSld>
+  <p:clrMapOvr>
+    <a:masterClrMapping/>
+  </p:clrMapOvr>
+</p:sld>
+</file>
+
+<file path=ppt/slides/slide12.xml><?xml version="1.0" encoding="utf-8"?>
+<p:sld xmlns:a="http://schemas.openxmlformats.org/drawingml/2006/main" xmlns:r="http://schemas.openxmlformats.org/officeDocument/2006/relationships" xmlns:p="http://schemas.openxmlformats.org/presentationml/2006/main">
+  <p:cSld>
+    <p:spTree>
+      <p:nvGrpSpPr>
+        <p:cNvPr id="1" name=""/>
+        <p:cNvGrpSpPr/>
+        <p:nvPr/>
+      </p:nvGrpSpPr>
+      <p:grpSpPr>
+        <a:xfrm>
+          <a:off x="0" y="0"/>
+          <a:ext cx="0" cy="0"/>
+          <a:chOff x="0" y="0"/>
+          <a:chExt cx="0" cy="0"/>
+        </a:xfrm>
+      </p:grpSpPr>
+      <p:sp>
+        <p:nvSpPr>
+          <p:cNvPr id="2" name="标题 1">
+            <a:extLst>
+              <a:ext uri="{FF2B5EF4-FFF2-40B4-BE49-F238E27FC236}">
+                <a16:creationId xmlns:a16="http://schemas.microsoft.com/office/drawing/2014/main" id="{2E88A736-0111-430D-10D2-830B29219C23}"/>
+              </a:ext>
+            </a:extLst>
+          </p:cNvPr>
+          <p:cNvSpPr>
+            <a:spLocks noGrp="1"/>
+          </p:cNvSpPr>
+          <p:nvPr>
+            <p:ph type="ctrTitle"/>
+          </p:nvPr>
+        </p:nvSpPr>
+        <p:spPr>
+          <a:xfrm>
+            <a:off x="1228164" y="1113398"/>
+            <a:ext cx="9735671" cy="2387600"/>
+          </a:xfrm>
+        </p:spPr>
+        <p:txBody>
+          <a:bodyPr>
+            <a:normAutofit/>
+          </a:bodyPr>
+          <a:lstStyle/>
+          <a:p>
+            <a:pPr>
+              <a:lnSpc>
+                <a:spcPct val="150000"/>
+              </a:lnSpc>
+            </a:pPr>
+            <a:r>
+              <a:rPr lang="en-US" altLang="zh-CN" sz="4000" dirty="0"/>
+              <a:t>Thank you for watching!</a:t>
+            </a:r>
+            <a:br>
+              <a:rPr lang="en-US" altLang="zh-CN" sz="4800" dirty="0"/>
+            </a:br>
+            <a:r>
+              <a:rPr lang="en-US" altLang="zh-CN" sz="1800" b="1" dirty="0">
+                <a:latin typeface="Times New Roman" panose="02020603050405020304" pitchFamily="18" charset="0"/>
+                <a:cs typeface="Times New Roman" panose="02020603050405020304" pitchFamily="18" charset="0"/>
+              </a:rPr>
+              <a:t>The performance of TCP/IP for networks with high bandwidth-delay products and random loss</a:t>
+            </a:r>
+            <a:endParaRPr lang="zh-CN" altLang="en-US" sz="4800" b="1" dirty="0">
+              <a:latin typeface="Times New Roman" panose="02020603050405020304" pitchFamily="18" charset="0"/>
+              <a:cs typeface="Times New Roman" panose="02020603050405020304" pitchFamily="18" charset="0"/>
+            </a:endParaRPr>
+          </a:p>
+        </p:txBody>
+      </p:sp>
+      <p:sp>
+        <p:nvSpPr>
+          <p:cNvPr id="3" name="副标题 2">
+            <a:extLst>
+              <a:ext uri="{FF2B5EF4-FFF2-40B4-BE49-F238E27FC236}">
+                <a16:creationId xmlns:a16="http://schemas.microsoft.com/office/drawing/2014/main" id="{F315F74C-6539-626A-511B-319466841360}"/>
+              </a:ext>
+            </a:extLst>
+          </p:cNvPr>
+          <p:cNvSpPr>
+            <a:spLocks noGrp="1"/>
+          </p:cNvSpPr>
+          <p:nvPr>
+            <p:ph type="subTitle" idx="1"/>
+          </p:nvPr>
+        </p:nvSpPr>
+        <p:spPr>
+          <a:xfrm>
+            <a:off x="1523999" y="3951662"/>
+            <a:ext cx="9144000" cy="1655762"/>
+          </a:xfrm>
+        </p:spPr>
+        <p:txBody>
+          <a:bodyPr>
+            <a:normAutofit/>
+          </a:bodyPr>
+          <a:lstStyle/>
+          <a:p>
+            <a:r>
+              <a:rPr lang="en-US" altLang="zh-CN" sz="1800" dirty="0"/>
+              <a:t>Presenter: Boyang Xiao</a:t>
+            </a:r>
+          </a:p>
+          <a:p>
+            <a:r>
+              <a:rPr lang="en-US" altLang="zh-CN" sz="1800" dirty="0"/>
+              <a:t>USC id: 3326730274</a:t>
+            </a:r>
+          </a:p>
+          <a:p>
+            <a:r>
+              <a:rPr lang="en-US" altLang="zh-CN" sz="1800" dirty="0"/>
+              <a:t>Email: boyangxi@usc.edu</a:t>
+            </a:r>
+            <a:endParaRPr lang="zh-CN" altLang="en-US" sz="1800" dirty="0"/>
+          </a:p>
+        </p:txBody>
+      </p:sp>
+    </p:spTree>
+    <p:extLst>
+      <p:ext uri="{BB962C8B-B14F-4D97-AF65-F5344CB8AC3E}">
+        <p14:creationId xmlns:p14="http://schemas.microsoft.com/office/powerpoint/2010/main" val="273259232"/>
+      </p:ext>
+    </p:extLst>
+  </p:cSld>
+  <p:clrMapOvr>
+    <a:masterClrMapping/>
+  </p:clrMapOvr>
+</p:sld>
+</file>
+
 <file path=ppt/slides/slide2.xml><?xml version="1.0" encoding="utf-8"?>
 <p:sld xmlns:a="http://schemas.openxmlformats.org/drawingml/2006/main" xmlns:r="http://schemas.openxmlformats.org/officeDocument/2006/relationships" xmlns:p="http://schemas.openxmlformats.org/presentationml/2006/main">
   <p:cSld>
@@ -5711,14 +6208,51 @@
               </a:rPr>
               <a:t>independent</a:t>
             </a:r>
-            <a:endParaRPr lang="zh-CN" altLang="en-US" dirty="0">
-              <a:solidFill>
-                <a:srgbClr val="FF0000"/>
-              </a:solidFill>
-            </a:endParaRPr>
-          </a:p>
-        </p:txBody>
-      </p:sp>
+          </a:p>
+          <a:p>
+            <a:r>
+              <a:rPr lang="en-US" altLang="zh-CN" dirty="0"/>
+              <a:t>Throughput under random losses</a:t>
+            </a:r>
+          </a:p>
+        </p:txBody>
+      </p:sp>
+      <p:pic>
+        <p:nvPicPr>
+          <p:cNvPr id="5" name="Picture 4">
+            <a:extLst>
+              <a:ext uri="{FF2B5EF4-FFF2-40B4-BE49-F238E27FC236}">
+                <a16:creationId xmlns:a16="http://schemas.microsoft.com/office/drawing/2014/main" id="{A4D88015-B06D-5078-1169-D50280A15FA6}"/>
+              </a:ext>
+            </a:extLst>
+          </p:cNvPr>
+          <p:cNvPicPr>
+            <a:picLocks noChangeAspect="1"/>
+          </p:cNvPicPr>
+          <p:nvPr/>
+        </p:nvPicPr>
+        <p:blipFill>
+          <a:blip r:embed="rId2">
+            <a:extLst>
+              <a:ext uri="{28A0092B-C50C-407E-A947-70E740481C1C}">
+                <a14:useLocalDpi xmlns:a14="http://schemas.microsoft.com/office/drawing/2010/main" val="0"/>
+              </a:ext>
+            </a:extLst>
+          </a:blip>
+          <a:stretch>
+            <a:fillRect/>
+          </a:stretch>
+        </p:blipFill>
+        <p:spPr>
+          <a:xfrm>
+            <a:off x="2787060" y="3764664"/>
+            <a:ext cx="5448300" cy="1689100"/>
+          </a:xfrm>
+          <a:prstGeom prst="rect">
+            <a:avLst/>
+          </a:prstGeom>
+        </p:spPr>
+      </p:pic>
     </p:spTree>
     <p:extLst>
       <p:ext uri="{BB962C8B-B14F-4D97-AF65-F5344CB8AC3E}">

</xml_diff>